<commit_message>
Completed Slides and added Screencast to Docs Directory
</commit_message>
<xml_diff>
--- a/docs/Slides_detailled_version.pptx
+++ b/docs/Slides_detailled_version.pptx
@@ -7,18 +7,23 @@
   <p:sldIdLst>
     <p:sldId id="256" r:id="rId2"/>
     <p:sldId id="258" r:id="rId3"/>
-    <p:sldId id="263" r:id="rId4"/>
-    <p:sldId id="264" r:id="rId5"/>
-    <p:sldId id="268" r:id="rId6"/>
-    <p:sldId id="265" r:id="rId7"/>
-    <p:sldId id="269" r:id="rId8"/>
-    <p:sldId id="257" r:id="rId9"/>
-    <p:sldId id="266" r:id="rId10"/>
-    <p:sldId id="260" r:id="rId11"/>
-    <p:sldId id="259" r:id="rId12"/>
-    <p:sldId id="271" r:id="rId13"/>
-    <p:sldId id="261" r:id="rId14"/>
-    <p:sldId id="270" r:id="rId15"/>
+    <p:sldId id="273" r:id="rId4"/>
+    <p:sldId id="274" r:id="rId5"/>
+    <p:sldId id="275" r:id="rId6"/>
+    <p:sldId id="276" r:id="rId7"/>
+    <p:sldId id="272" r:id="rId8"/>
+    <p:sldId id="263" r:id="rId9"/>
+    <p:sldId id="264" r:id="rId10"/>
+    <p:sldId id="268" r:id="rId11"/>
+    <p:sldId id="265" r:id="rId12"/>
+    <p:sldId id="269" r:id="rId13"/>
+    <p:sldId id="257" r:id="rId14"/>
+    <p:sldId id="266" r:id="rId15"/>
+    <p:sldId id="260" r:id="rId16"/>
+    <p:sldId id="259" r:id="rId17"/>
+    <p:sldId id="271" r:id="rId18"/>
+    <p:sldId id="261" r:id="rId19"/>
+    <p:sldId id="270" r:id="rId20"/>
   </p:sldIdLst>
   <p:sldSz cx="9144000" cy="6858000" type="screen4x3"/>
   <p:notesSz cx="6858000" cy="9144000"/>
@@ -4291,6 +4296,871 @@
           <a:p>
             <a:r>
               <a:rPr lang="de-CH" dirty="0" smtClean="0"/>
+              <a:t>Technologie-Übersicht </a:t>
+            </a:r>
+            <a:r>
+              <a:rPr lang="de-CH" dirty="0" smtClean="0">
+                <a:solidFill>
+                  <a:schemeClr val="accent1">
+                    <a:lumMod val="60000"/>
+                    <a:lumOff val="40000"/>
+                  </a:schemeClr>
+                </a:solidFill>
+              </a:rPr>
+              <a:t>clientseitig</a:t>
+            </a:r>
+            <a:endParaRPr lang="de-CH" dirty="0">
+              <a:solidFill>
+                <a:schemeClr val="accent1">
+                  <a:lumMod val="60000"/>
+                  <a:lumOff val="40000"/>
+                </a:schemeClr>
+              </a:solidFill>
+            </a:endParaRPr>
+          </a:p>
+        </p:txBody>
+      </p:sp>
+      <p:sp>
+        <p:nvSpPr>
+          <p:cNvPr id="3" name="Inhaltsplatzhalter 2"/>
+          <p:cNvSpPr>
+            <a:spLocks noGrp="1"/>
+          </p:cNvSpPr>
+          <p:nvPr>
+            <p:ph idx="1"/>
+          </p:nvPr>
+        </p:nvSpPr>
+        <p:spPr/>
+        <p:txBody>
+          <a:bodyPr>
+            <a:normAutofit/>
+          </a:bodyPr>
+          <a:lstStyle/>
+          <a:p>
+            <a:r>
+              <a:rPr lang="de-CH" dirty="0" err="1" smtClean="0"/>
+              <a:t>RequireJS</a:t>
+            </a:r>
+            <a:endParaRPr lang="de-CH" dirty="0" smtClean="0"/>
+          </a:p>
+          <a:p>
+            <a:pPr lvl="1"/>
+            <a:r>
+              <a:rPr lang="de-CH" dirty="0" smtClean="0"/>
+              <a:t>Dynamisches Nachladen benötigter JavaScript-Dateien</a:t>
+            </a:r>
+          </a:p>
+          <a:p>
+            <a:pPr lvl="1"/>
+            <a:r>
+              <a:rPr lang="de-CH" dirty="0" err="1" smtClean="0"/>
+              <a:t>Dependency-Manangement</a:t>
+            </a:r>
+            <a:r>
+              <a:rPr lang="de-CH" dirty="0" smtClean="0"/>
+              <a:t>, um sicherzustellen, dass Ladereihenfolge der </a:t>
+            </a:r>
+            <a:r>
+              <a:rPr lang="de-CH" dirty="0" err="1" smtClean="0"/>
+              <a:t>Javascript</a:t>
+            </a:r>
+            <a:r>
+              <a:rPr lang="de-CH" dirty="0" smtClean="0"/>
+              <a:t>-Dateien korrekt ist</a:t>
+            </a:r>
+          </a:p>
+          <a:p>
+            <a:pPr lvl="1"/>
+            <a:r>
+              <a:rPr lang="de-CH" dirty="0" smtClean="0"/>
+              <a:t>Dank </a:t>
+            </a:r>
+            <a:r>
+              <a:rPr lang="de-CH" dirty="0" err="1" smtClean="0"/>
+              <a:t>RequireJS</a:t>
+            </a:r>
+            <a:r>
+              <a:rPr lang="de-CH" dirty="0" smtClean="0"/>
+              <a:t> ist im effektiven HTML-Dokument nur noch ein Script-Tag nötig: Den auf RequireJS.js</a:t>
+            </a:r>
+            <a:endParaRPr lang="de-CH" dirty="0"/>
+          </a:p>
+          <a:p>
+            <a:pPr lvl="1"/>
+            <a:r>
+              <a:rPr lang="de-CH" dirty="0">
+                <a:hlinkClick r:id="rId2"/>
+              </a:rPr>
+              <a:t>http://requirejs.org/</a:t>
+            </a:r>
+            <a:endParaRPr lang="de-CH" dirty="0" smtClean="0"/>
+          </a:p>
+        </p:txBody>
+      </p:sp>
+    </p:spTree>
+    <p:extLst>
+      <p:ext uri="{BB962C8B-B14F-4D97-AF65-F5344CB8AC3E}">
+        <p14:creationId xmlns:p14="http://schemas.microsoft.com/office/powerpoint/2010/main" val="1475712476"/>
+      </p:ext>
+    </p:extLst>
+  </p:cSld>
+  <p:clrMapOvr>
+    <a:masterClrMapping/>
+  </p:clrMapOvr>
+</p:sld>
+</file>
+
+<file path=ppt/slides/slide11.xml><?xml version="1.0" encoding="utf-8"?>
+<p:sld xmlns:a="http://schemas.openxmlformats.org/drawingml/2006/main" xmlns:r="http://schemas.openxmlformats.org/officeDocument/2006/relationships" xmlns:p="http://schemas.openxmlformats.org/presentationml/2006/main">
+  <p:cSld>
+    <p:spTree>
+      <p:nvGrpSpPr>
+        <p:cNvPr id="1" name=""/>
+        <p:cNvGrpSpPr/>
+        <p:nvPr/>
+      </p:nvGrpSpPr>
+      <p:grpSpPr>
+        <a:xfrm>
+          <a:off x="0" y="0"/>
+          <a:ext cx="0" cy="0"/>
+          <a:chOff x="0" y="0"/>
+          <a:chExt cx="0" cy="0"/>
+        </a:xfrm>
+      </p:grpSpPr>
+      <p:sp>
+        <p:nvSpPr>
+          <p:cNvPr id="2" name="Titel 1"/>
+          <p:cNvSpPr>
+            <a:spLocks noGrp="1"/>
+          </p:cNvSpPr>
+          <p:nvPr>
+            <p:ph type="title"/>
+          </p:nvPr>
+        </p:nvSpPr>
+        <p:spPr/>
+        <p:txBody>
+          <a:bodyPr/>
+          <a:lstStyle/>
+          <a:p>
+            <a:r>
+              <a:rPr lang="de-CH" dirty="0" smtClean="0"/>
+              <a:t>Technologie-Übersicht </a:t>
+            </a:r>
+            <a:r>
+              <a:rPr lang="de-CH" dirty="0" smtClean="0">
+                <a:solidFill>
+                  <a:schemeClr val="accent1">
+                    <a:lumMod val="60000"/>
+                    <a:lumOff val="40000"/>
+                  </a:schemeClr>
+                </a:solidFill>
+              </a:rPr>
+              <a:t>clientseitig</a:t>
+            </a:r>
+            <a:endParaRPr lang="de-CH" dirty="0">
+              <a:solidFill>
+                <a:schemeClr val="accent1">
+                  <a:lumMod val="60000"/>
+                  <a:lumOff val="40000"/>
+                </a:schemeClr>
+              </a:solidFill>
+            </a:endParaRPr>
+          </a:p>
+        </p:txBody>
+      </p:sp>
+      <p:sp>
+        <p:nvSpPr>
+          <p:cNvPr id="3" name="Inhaltsplatzhalter 2"/>
+          <p:cNvSpPr>
+            <a:spLocks noGrp="1"/>
+          </p:cNvSpPr>
+          <p:nvPr>
+            <p:ph idx="1"/>
+          </p:nvPr>
+        </p:nvSpPr>
+        <p:spPr/>
+        <p:txBody>
+          <a:bodyPr>
+            <a:normAutofit/>
+          </a:bodyPr>
+          <a:lstStyle/>
+          <a:p>
+            <a:r>
+              <a:rPr lang="de-CH" dirty="0" err="1" smtClean="0"/>
+              <a:t>Durandal</a:t>
+            </a:r>
+            <a:endParaRPr lang="de-CH" dirty="0" smtClean="0"/>
+          </a:p>
+          <a:p>
+            <a:pPr lvl="1"/>
+            <a:r>
+              <a:rPr lang="de-CH" dirty="0" smtClean="0"/>
+              <a:t>Ermöglicht es, </a:t>
+            </a:r>
+            <a:r>
+              <a:rPr lang="de-CH" dirty="0" err="1" smtClean="0"/>
+              <a:t>OnePage</a:t>
+            </a:r>
+            <a:r>
+              <a:rPr lang="de-CH" dirty="0" smtClean="0"/>
+              <a:t>-Websites zu erstellen</a:t>
+            </a:r>
+          </a:p>
+          <a:p>
+            <a:pPr lvl="1"/>
+            <a:r>
+              <a:rPr lang="de-CH" dirty="0" smtClean="0"/>
+              <a:t>Einzelne Seiten werden mittels Hashtag in der URL referenziert, </a:t>
+            </a:r>
+            <a:r>
+              <a:rPr lang="de-CH" dirty="0" err="1" smtClean="0"/>
+              <a:t>z.B</a:t>
+            </a:r>
+            <a:r>
+              <a:rPr lang="de-CH" dirty="0" smtClean="0"/>
+              <a:t>: http</a:t>
+            </a:r>
+            <a:r>
+              <a:rPr lang="de-CH" dirty="0" smtClean="0">
+                <a:sym typeface="Wingdings" panose="05000000000000000000" pitchFamily="2" charset="2"/>
+              </a:rPr>
+              <a:t>://localhost:9000/backend#adressen </a:t>
+            </a:r>
+          </a:p>
+          <a:p>
+            <a:pPr lvl="1"/>
+            <a:r>
+              <a:rPr lang="de-CH" dirty="0" smtClean="0">
+                <a:sym typeface="Wingdings" panose="05000000000000000000" pitchFamily="2" charset="2"/>
+              </a:rPr>
+              <a:t>Ist ein Zusammenzug von </a:t>
+            </a:r>
+            <a:r>
+              <a:rPr lang="de-CH" dirty="0" err="1" smtClean="0">
+                <a:sym typeface="Wingdings" panose="05000000000000000000" pitchFamily="2" charset="2"/>
+              </a:rPr>
+              <a:t>JQuery</a:t>
+            </a:r>
+            <a:r>
+              <a:rPr lang="de-CH" dirty="0" smtClean="0">
+                <a:sym typeface="Wingdings" panose="05000000000000000000" pitchFamily="2" charset="2"/>
+              </a:rPr>
+              <a:t>, Knockout, </a:t>
+            </a:r>
+            <a:r>
+              <a:rPr lang="de-CH" dirty="0" err="1" smtClean="0">
+                <a:sym typeface="Wingdings" panose="05000000000000000000" pitchFamily="2" charset="2"/>
+              </a:rPr>
+              <a:t>RequireJS</a:t>
+            </a:r>
+            <a:r>
+              <a:rPr lang="de-CH" dirty="0" smtClean="0">
+                <a:sym typeface="Wingdings" panose="05000000000000000000" pitchFamily="2" charset="2"/>
+              </a:rPr>
+              <a:t> und Teilen von Backbone</a:t>
+            </a:r>
+          </a:p>
+          <a:p>
+            <a:pPr lvl="1"/>
+            <a:r>
+              <a:rPr lang="de-CH" dirty="0">
+                <a:hlinkClick r:id="rId2"/>
+              </a:rPr>
+              <a:t>http://durandaljs.com/</a:t>
+            </a:r>
+            <a:r>
+              <a:rPr lang="de-CH" dirty="0" smtClean="0">
+                <a:sym typeface="Wingdings" panose="05000000000000000000" pitchFamily="2" charset="2"/>
+              </a:rPr>
+              <a:t> </a:t>
+            </a:r>
+            <a:endParaRPr lang="de-CH" dirty="0" smtClean="0"/>
+          </a:p>
+        </p:txBody>
+      </p:sp>
+    </p:spTree>
+    <p:extLst>
+      <p:ext uri="{BB962C8B-B14F-4D97-AF65-F5344CB8AC3E}">
+        <p14:creationId xmlns:p14="http://schemas.microsoft.com/office/powerpoint/2010/main" val="3553915380"/>
+      </p:ext>
+    </p:extLst>
+  </p:cSld>
+  <p:clrMapOvr>
+    <a:masterClrMapping/>
+  </p:clrMapOvr>
+</p:sld>
+</file>
+
+<file path=ppt/slides/slide12.xml><?xml version="1.0" encoding="utf-8"?>
+<p:sld xmlns:a="http://schemas.openxmlformats.org/drawingml/2006/main" xmlns:r="http://schemas.openxmlformats.org/officeDocument/2006/relationships" xmlns:p="http://schemas.openxmlformats.org/presentationml/2006/main">
+  <p:cSld>
+    <p:spTree>
+      <p:nvGrpSpPr>
+        <p:cNvPr id="1" name=""/>
+        <p:cNvGrpSpPr/>
+        <p:nvPr/>
+      </p:nvGrpSpPr>
+      <p:grpSpPr>
+        <a:xfrm>
+          <a:off x="0" y="0"/>
+          <a:ext cx="0" cy="0"/>
+          <a:chOff x="0" y="0"/>
+          <a:chExt cx="0" cy="0"/>
+        </a:xfrm>
+      </p:grpSpPr>
+      <p:sp>
+        <p:nvSpPr>
+          <p:cNvPr id="2" name="Titel 1"/>
+          <p:cNvSpPr>
+            <a:spLocks noGrp="1"/>
+          </p:cNvSpPr>
+          <p:nvPr>
+            <p:ph type="title"/>
+          </p:nvPr>
+        </p:nvSpPr>
+        <p:spPr/>
+        <p:txBody>
+          <a:bodyPr/>
+          <a:lstStyle/>
+          <a:p>
+            <a:r>
+              <a:rPr lang="de-CH" dirty="0" smtClean="0"/>
+              <a:t>Technologie-Übersicht </a:t>
+            </a:r>
+            <a:r>
+              <a:rPr lang="de-CH" dirty="0" smtClean="0">
+                <a:solidFill>
+                  <a:schemeClr val="accent1">
+                    <a:lumMod val="60000"/>
+                    <a:lumOff val="40000"/>
+                  </a:schemeClr>
+                </a:solidFill>
+              </a:rPr>
+              <a:t>clientseitig</a:t>
+            </a:r>
+            <a:endParaRPr lang="de-CH" dirty="0">
+              <a:solidFill>
+                <a:schemeClr val="accent1">
+                  <a:lumMod val="60000"/>
+                  <a:lumOff val="40000"/>
+                </a:schemeClr>
+              </a:solidFill>
+            </a:endParaRPr>
+          </a:p>
+        </p:txBody>
+      </p:sp>
+      <p:sp>
+        <p:nvSpPr>
+          <p:cNvPr id="3" name="Inhaltsplatzhalter 2"/>
+          <p:cNvSpPr>
+            <a:spLocks noGrp="1"/>
+          </p:cNvSpPr>
+          <p:nvPr>
+            <p:ph idx="1"/>
+          </p:nvPr>
+        </p:nvSpPr>
+        <p:spPr/>
+        <p:txBody>
+          <a:bodyPr>
+            <a:normAutofit/>
+          </a:bodyPr>
+          <a:lstStyle/>
+          <a:p>
+            <a:r>
+              <a:rPr lang="de-CH" dirty="0" err="1" smtClean="0"/>
+              <a:t>TypeAhead</a:t>
+            </a:r>
+            <a:endParaRPr lang="de-CH" dirty="0" smtClean="0"/>
+          </a:p>
+          <a:p>
+            <a:pPr lvl="1"/>
+            <a:r>
+              <a:rPr lang="de-CH" dirty="0" err="1" smtClean="0"/>
+              <a:t>TypeAhead</a:t>
+            </a:r>
+            <a:r>
+              <a:rPr lang="de-CH" dirty="0" smtClean="0"/>
+              <a:t> Input-Feld von den Twitter Jungs</a:t>
+            </a:r>
+          </a:p>
+          <a:p>
+            <a:pPr lvl="1"/>
+            <a:r>
+              <a:rPr lang="de-CH" dirty="0" smtClean="0"/>
+              <a:t>Demo siehe </a:t>
+            </a:r>
+            <a:r>
+              <a:rPr lang="de-CH" dirty="0">
+                <a:hlinkClick r:id="rId2"/>
+              </a:rPr>
+              <a:t>http://twitter.github.io/typeahead.js/</a:t>
+            </a:r>
+            <a:endParaRPr lang="de-CH" dirty="0" smtClean="0"/>
+          </a:p>
+          <a:p>
+            <a:pPr lvl="1"/>
+            <a:endParaRPr lang="de-CH" dirty="0" smtClean="0"/>
+          </a:p>
+        </p:txBody>
+      </p:sp>
+    </p:spTree>
+    <p:extLst>
+      <p:ext uri="{BB962C8B-B14F-4D97-AF65-F5344CB8AC3E}">
+        <p14:creationId xmlns:p14="http://schemas.microsoft.com/office/powerpoint/2010/main" val="172362945"/>
+      </p:ext>
+    </p:extLst>
+  </p:cSld>
+  <p:clrMapOvr>
+    <a:masterClrMapping/>
+  </p:clrMapOvr>
+</p:sld>
+</file>
+
+<file path=ppt/slides/slide13.xml><?xml version="1.0" encoding="utf-8"?>
+<p:sld xmlns:a="http://schemas.openxmlformats.org/drawingml/2006/main" xmlns:r="http://schemas.openxmlformats.org/officeDocument/2006/relationships" xmlns:p="http://schemas.openxmlformats.org/presentationml/2006/main">
+  <p:cSld>
+    <p:spTree>
+      <p:nvGrpSpPr>
+        <p:cNvPr id="1" name=""/>
+        <p:cNvGrpSpPr/>
+        <p:nvPr/>
+      </p:nvGrpSpPr>
+      <p:grpSpPr>
+        <a:xfrm>
+          <a:off x="0" y="0"/>
+          <a:ext cx="0" cy="0"/>
+          <a:chOff x="0" y="0"/>
+          <a:chExt cx="0" cy="0"/>
+        </a:xfrm>
+      </p:grpSpPr>
+      <p:sp>
+        <p:nvSpPr>
+          <p:cNvPr id="2" name="Titel 1"/>
+          <p:cNvSpPr>
+            <a:spLocks noGrp="1"/>
+          </p:cNvSpPr>
+          <p:nvPr>
+            <p:ph type="title"/>
+          </p:nvPr>
+        </p:nvSpPr>
+        <p:spPr/>
+        <p:txBody>
+          <a:bodyPr/>
+          <a:lstStyle/>
+          <a:p>
+            <a:r>
+              <a:rPr lang="de-CH" dirty="0" smtClean="0"/>
+              <a:t>Technologie-Übersicht </a:t>
+            </a:r>
+            <a:r>
+              <a:rPr lang="de-CH" dirty="0" smtClean="0">
+                <a:solidFill>
+                  <a:schemeClr val="accent1">
+                    <a:lumMod val="60000"/>
+                    <a:lumOff val="40000"/>
+                  </a:schemeClr>
+                </a:solidFill>
+              </a:rPr>
+              <a:t>serverseitig</a:t>
+            </a:r>
+            <a:endParaRPr lang="de-CH" dirty="0">
+              <a:solidFill>
+                <a:schemeClr val="accent1">
+                  <a:lumMod val="60000"/>
+                  <a:lumOff val="40000"/>
+                </a:schemeClr>
+              </a:solidFill>
+            </a:endParaRPr>
+          </a:p>
+        </p:txBody>
+      </p:sp>
+      <p:sp>
+        <p:nvSpPr>
+          <p:cNvPr id="3" name="Inhaltsplatzhalter 2"/>
+          <p:cNvSpPr>
+            <a:spLocks noGrp="1"/>
+          </p:cNvSpPr>
+          <p:nvPr>
+            <p:ph idx="1"/>
+          </p:nvPr>
+        </p:nvSpPr>
+        <p:spPr/>
+        <p:txBody>
+          <a:bodyPr/>
+          <a:lstStyle/>
+          <a:p>
+            <a:r>
+              <a:rPr lang="de-CH" dirty="0" smtClean="0"/>
+              <a:t>Play Framework (Java)</a:t>
+            </a:r>
+          </a:p>
+          <a:p>
+            <a:r>
+              <a:rPr lang="de-CH" dirty="0" smtClean="0"/>
+              <a:t>Der Framework besteht intern aus:</a:t>
+            </a:r>
+          </a:p>
+          <a:p>
+            <a:pPr lvl="1"/>
+            <a:r>
+              <a:rPr lang="de-CH" dirty="0" err="1" smtClean="0"/>
+              <a:t>Jetty</a:t>
+            </a:r>
+            <a:r>
+              <a:rPr lang="de-CH" dirty="0" smtClean="0"/>
+              <a:t> HTTP-Server</a:t>
+            </a:r>
+          </a:p>
+          <a:p>
+            <a:pPr lvl="1"/>
+            <a:r>
+              <a:rPr lang="de-CH" dirty="0" err="1" smtClean="0"/>
+              <a:t>Ebean</a:t>
+            </a:r>
+            <a:r>
+              <a:rPr lang="de-CH" dirty="0" smtClean="0"/>
+              <a:t> ORM </a:t>
+            </a:r>
+            <a:r>
+              <a:rPr lang="de-CH" dirty="0" smtClean="0">
+                <a:sym typeface="Wingdings" panose="05000000000000000000" pitchFamily="2" charset="2"/>
+              </a:rPr>
+              <a:t> JDBC  MySQL</a:t>
+            </a:r>
+          </a:p>
+          <a:p>
+            <a:pPr lvl="1"/>
+            <a:r>
+              <a:rPr lang="de-CH" dirty="0" smtClean="0">
+                <a:sym typeface="Wingdings" panose="05000000000000000000" pitchFamily="2" charset="2"/>
+              </a:rPr>
+              <a:t>SBT-</a:t>
+            </a:r>
+            <a:r>
+              <a:rPr lang="de-CH" dirty="0" err="1" smtClean="0">
+                <a:sym typeface="Wingdings" panose="05000000000000000000" pitchFamily="2" charset="2"/>
+              </a:rPr>
+              <a:t>Buildsystem</a:t>
+            </a:r>
+            <a:r>
+              <a:rPr lang="de-CH" dirty="0" smtClean="0">
+                <a:sym typeface="Wingdings" panose="05000000000000000000" pitchFamily="2" charset="2"/>
+              </a:rPr>
+              <a:t> (à la </a:t>
+            </a:r>
+            <a:r>
+              <a:rPr lang="de-CH" dirty="0" err="1" smtClean="0">
+                <a:sym typeface="Wingdings" panose="05000000000000000000" pitchFamily="2" charset="2"/>
+              </a:rPr>
+              <a:t>Maven</a:t>
+            </a:r>
+            <a:r>
+              <a:rPr lang="de-CH" dirty="0" smtClean="0">
+                <a:sym typeface="Wingdings" panose="05000000000000000000" pitchFamily="2" charset="2"/>
+              </a:rPr>
+              <a:t>)</a:t>
+            </a:r>
+          </a:p>
+          <a:p>
+            <a:pPr lvl="1"/>
+            <a:r>
+              <a:rPr lang="de-CH" dirty="0" smtClean="0">
+                <a:sym typeface="Wingdings" panose="05000000000000000000" pitchFamily="2" charset="2"/>
+              </a:rPr>
+              <a:t>Jackson (</a:t>
+            </a:r>
+            <a:r>
+              <a:rPr lang="de-CH" dirty="0" err="1" smtClean="0">
+                <a:sym typeface="Wingdings" panose="05000000000000000000" pitchFamily="2" charset="2"/>
+              </a:rPr>
+              <a:t>Json</a:t>
+            </a:r>
+            <a:r>
+              <a:rPr lang="de-CH" dirty="0" smtClean="0">
+                <a:sym typeface="Wingdings" panose="05000000000000000000" pitchFamily="2" charset="2"/>
+              </a:rPr>
+              <a:t> Parser/</a:t>
+            </a:r>
+            <a:r>
+              <a:rPr lang="de-CH" dirty="0" err="1" smtClean="0">
+                <a:sym typeface="Wingdings" panose="05000000000000000000" pitchFamily="2" charset="2"/>
+              </a:rPr>
+              <a:t>Builder</a:t>
+            </a:r>
+            <a:r>
+              <a:rPr lang="de-CH" dirty="0" smtClean="0">
+                <a:sym typeface="Wingdings" panose="05000000000000000000" pitchFamily="2" charset="2"/>
+              </a:rPr>
+              <a:t>)</a:t>
+            </a:r>
+          </a:p>
+          <a:p>
+            <a:r>
+              <a:rPr lang="de-CH" dirty="0" smtClean="0">
+                <a:sym typeface="Wingdings" panose="05000000000000000000" pitchFamily="2" charset="2"/>
+              </a:rPr>
+              <a:t>Aufbau: </a:t>
+            </a:r>
+            <a:r>
+              <a:rPr lang="de-CH" dirty="0">
+                <a:hlinkClick r:id="rId2"/>
+              </a:rPr>
+              <a:t>http://www.playframework.com/documentation/2.2.0/Anatomy</a:t>
+            </a:r>
+            <a:endParaRPr lang="de-CH" dirty="0" smtClean="0">
+              <a:sym typeface="Wingdings" panose="05000000000000000000" pitchFamily="2" charset="2"/>
+            </a:endParaRPr>
+          </a:p>
+        </p:txBody>
+      </p:sp>
+    </p:spTree>
+    <p:extLst>
+      <p:ext uri="{BB962C8B-B14F-4D97-AF65-F5344CB8AC3E}">
+        <p14:creationId xmlns:p14="http://schemas.microsoft.com/office/powerpoint/2010/main" val="3398293374"/>
+      </p:ext>
+    </p:extLst>
+  </p:cSld>
+  <p:clrMapOvr>
+    <a:masterClrMapping/>
+  </p:clrMapOvr>
+</p:sld>
+</file>
+
+<file path=ppt/slides/slide14.xml><?xml version="1.0" encoding="utf-8"?>
+<p:sld xmlns:a="http://schemas.openxmlformats.org/drawingml/2006/main" xmlns:r="http://schemas.openxmlformats.org/officeDocument/2006/relationships" xmlns:p="http://schemas.openxmlformats.org/presentationml/2006/main">
+  <p:cSld>
+    <p:spTree>
+      <p:nvGrpSpPr>
+        <p:cNvPr id="1" name=""/>
+        <p:cNvGrpSpPr/>
+        <p:nvPr/>
+      </p:nvGrpSpPr>
+      <p:grpSpPr>
+        <a:xfrm>
+          <a:off x="0" y="0"/>
+          <a:ext cx="0" cy="0"/>
+          <a:chOff x="0" y="0"/>
+          <a:chExt cx="0" cy="0"/>
+        </a:xfrm>
+      </p:grpSpPr>
+      <p:sp>
+        <p:nvSpPr>
+          <p:cNvPr id="2" name="Titel 1"/>
+          <p:cNvSpPr>
+            <a:spLocks noGrp="1"/>
+          </p:cNvSpPr>
+          <p:nvPr>
+            <p:ph type="title"/>
+          </p:nvPr>
+        </p:nvSpPr>
+        <p:spPr/>
+        <p:txBody>
+          <a:bodyPr/>
+          <a:lstStyle/>
+          <a:p>
+            <a:r>
+              <a:rPr lang="de-CH" dirty="0" smtClean="0"/>
+              <a:t>Technologie-Übersicht </a:t>
+            </a:r>
+            <a:r>
+              <a:rPr lang="de-CH" dirty="0" smtClean="0">
+                <a:solidFill>
+                  <a:schemeClr val="accent1">
+                    <a:lumMod val="60000"/>
+                    <a:lumOff val="40000"/>
+                  </a:schemeClr>
+                </a:solidFill>
+              </a:rPr>
+              <a:t>serverseitig</a:t>
+            </a:r>
+            <a:endParaRPr lang="de-CH" dirty="0">
+              <a:solidFill>
+                <a:schemeClr val="accent1">
+                  <a:lumMod val="60000"/>
+                  <a:lumOff val="40000"/>
+                </a:schemeClr>
+              </a:solidFill>
+            </a:endParaRPr>
+          </a:p>
+        </p:txBody>
+      </p:sp>
+      <p:sp>
+        <p:nvSpPr>
+          <p:cNvPr id="3" name="Inhaltsplatzhalter 2"/>
+          <p:cNvSpPr>
+            <a:spLocks noGrp="1"/>
+          </p:cNvSpPr>
+          <p:nvPr>
+            <p:ph idx="1"/>
+          </p:nvPr>
+        </p:nvSpPr>
+        <p:spPr/>
+        <p:txBody>
+          <a:bodyPr/>
+          <a:lstStyle/>
+          <a:p>
+            <a:r>
+              <a:rPr lang="de-CH" dirty="0" smtClean="0"/>
+              <a:t>Play Framework (Java) ist durch </a:t>
+            </a:r>
+            <a:r>
+              <a:rPr lang="de-CH" dirty="0" err="1" smtClean="0"/>
+              <a:t>Plugins</a:t>
+            </a:r>
+            <a:r>
+              <a:rPr lang="de-CH" dirty="0" smtClean="0"/>
+              <a:t> erweiterbar. Zum Beispiel:</a:t>
+            </a:r>
+          </a:p>
+          <a:p>
+            <a:pPr lvl="2"/>
+            <a:r>
+              <a:rPr lang="de-CH" dirty="0" err="1" smtClean="0">
+                <a:sym typeface="Wingdings" panose="05000000000000000000" pitchFamily="2" charset="2"/>
+              </a:rPr>
+              <a:t>Deadbold</a:t>
+            </a:r>
+            <a:endParaRPr lang="de-CH" dirty="0" smtClean="0">
+              <a:sym typeface="Wingdings" panose="05000000000000000000" pitchFamily="2" charset="2"/>
+            </a:endParaRPr>
+          </a:p>
+          <a:p>
+            <a:pPr lvl="2"/>
+            <a:r>
+              <a:rPr lang="de-CH" dirty="0" smtClean="0">
+                <a:sym typeface="Wingdings" panose="05000000000000000000" pitchFamily="2" charset="2"/>
+              </a:rPr>
+              <a:t>Play </a:t>
+            </a:r>
+            <a:r>
+              <a:rPr lang="de-CH" dirty="0" err="1" smtClean="0">
+                <a:sym typeface="Wingdings" panose="05000000000000000000" pitchFamily="2" charset="2"/>
+              </a:rPr>
+              <a:t>Authenticate</a:t>
+            </a:r>
+            <a:endParaRPr lang="de-CH" dirty="0" smtClean="0">
+              <a:sym typeface="Wingdings" panose="05000000000000000000" pitchFamily="2" charset="2"/>
+            </a:endParaRPr>
+          </a:p>
+          <a:p>
+            <a:r>
+              <a:rPr lang="de-CH" dirty="0" smtClean="0">
+                <a:sym typeface="Wingdings" panose="05000000000000000000" pitchFamily="2" charset="2"/>
+              </a:rPr>
+              <a:t>Play Framework unterstützt diverse Entwicklungsumgebungen wie </a:t>
+            </a:r>
+            <a:r>
+              <a:rPr lang="de-CH" dirty="0" err="1" smtClean="0">
+                <a:sym typeface="Wingdings" panose="05000000000000000000" pitchFamily="2" charset="2"/>
+              </a:rPr>
+              <a:t>Eclipse</a:t>
+            </a:r>
+            <a:r>
+              <a:rPr lang="de-CH" dirty="0" smtClean="0">
+                <a:sym typeface="Wingdings" panose="05000000000000000000" pitchFamily="2" charset="2"/>
+              </a:rPr>
+              <a:t>, </a:t>
+            </a:r>
+            <a:r>
+              <a:rPr lang="de-CH" dirty="0" err="1" smtClean="0">
+                <a:sym typeface="Wingdings" panose="05000000000000000000" pitchFamily="2" charset="2"/>
+              </a:rPr>
+              <a:t>Netbeans</a:t>
+            </a:r>
+            <a:r>
+              <a:rPr lang="de-CH" dirty="0" smtClean="0">
+                <a:sym typeface="Wingdings" panose="05000000000000000000" pitchFamily="2" charset="2"/>
+              </a:rPr>
+              <a:t>, </a:t>
+            </a:r>
+            <a:r>
+              <a:rPr lang="de-CH" dirty="0" err="1" smtClean="0">
+                <a:sym typeface="Wingdings" panose="05000000000000000000" pitchFamily="2" charset="2"/>
+              </a:rPr>
+              <a:t>Intellij</a:t>
+            </a:r>
+            <a:r>
+              <a:rPr lang="de-CH" dirty="0" smtClean="0">
+                <a:sym typeface="Wingdings" panose="05000000000000000000" pitchFamily="2" charset="2"/>
+              </a:rPr>
+              <a:t>, …</a:t>
+            </a:r>
+          </a:p>
+          <a:p>
+            <a:r>
+              <a:rPr lang="de-CH" dirty="0" err="1" smtClean="0">
+                <a:sym typeface="Wingdings" panose="05000000000000000000" pitchFamily="2" charset="2"/>
+              </a:rPr>
+              <a:t>JetBrains’s</a:t>
+            </a:r>
+            <a:r>
+              <a:rPr lang="de-CH" dirty="0" smtClean="0">
+                <a:sym typeface="Wingdings" panose="05000000000000000000" pitchFamily="2" charset="2"/>
+              </a:rPr>
+              <a:t> </a:t>
+            </a:r>
+            <a:r>
+              <a:rPr lang="de-CH" dirty="0" err="1" smtClean="0">
+                <a:sym typeface="Wingdings" panose="05000000000000000000" pitchFamily="2" charset="2"/>
+              </a:rPr>
+              <a:t>Intellij</a:t>
+            </a:r>
+            <a:r>
+              <a:rPr lang="de-CH" dirty="0" smtClean="0">
+                <a:sym typeface="Wingdings" panose="05000000000000000000" pitchFamily="2" charset="2"/>
+              </a:rPr>
+              <a:t> kam in diesem Projekt zum Einsatz und ist sehr empfehlenswert</a:t>
+            </a:r>
+          </a:p>
+        </p:txBody>
+      </p:sp>
+    </p:spTree>
+    <p:extLst>
+      <p:ext uri="{BB962C8B-B14F-4D97-AF65-F5344CB8AC3E}">
+        <p14:creationId xmlns:p14="http://schemas.microsoft.com/office/powerpoint/2010/main" val="2984728119"/>
+      </p:ext>
+    </p:extLst>
+  </p:cSld>
+  <p:clrMapOvr>
+    <a:masterClrMapping/>
+  </p:clrMapOvr>
+</p:sld>
+</file>
+
+<file path=ppt/slides/slide15.xml><?xml version="1.0" encoding="utf-8"?>
+<p:sld xmlns:a="http://schemas.openxmlformats.org/drawingml/2006/main" xmlns:r="http://schemas.openxmlformats.org/officeDocument/2006/relationships" xmlns:p="http://schemas.openxmlformats.org/presentationml/2006/main">
+  <p:cSld>
+    <p:spTree>
+      <p:nvGrpSpPr>
+        <p:cNvPr id="1" name=""/>
+        <p:cNvGrpSpPr/>
+        <p:nvPr/>
+      </p:nvGrpSpPr>
+      <p:grpSpPr>
+        <a:xfrm>
+          <a:off x="0" y="0"/>
+          <a:ext cx="0" cy="0"/>
+          <a:chOff x="0" y="0"/>
+          <a:chExt cx="0" cy="0"/>
+        </a:xfrm>
+      </p:grpSpPr>
+      <p:sp>
+        <p:nvSpPr>
+          <p:cNvPr id="2" name="Titel 1"/>
+          <p:cNvSpPr>
+            <a:spLocks noGrp="1"/>
+          </p:cNvSpPr>
+          <p:nvPr>
+            <p:ph type="title"/>
+          </p:nvPr>
+        </p:nvSpPr>
+        <p:spPr/>
+        <p:txBody>
+          <a:bodyPr/>
+          <a:lstStyle/>
+          <a:p>
+            <a:r>
+              <a:rPr lang="de-CH" dirty="0" smtClean="0"/>
               <a:t>Play Framework - Highlights</a:t>
             </a:r>
             <a:endParaRPr lang="de-CH" dirty="0"/>
@@ -4450,7 +5320,7 @@
 </p:sld>
 </file>
 
-<file path=ppt/slides/slide11.xml><?xml version="1.0" encoding="utf-8"?>
+<file path=ppt/slides/slide16.xml><?xml version="1.0" encoding="utf-8"?>
 <p:sld xmlns:a="http://schemas.openxmlformats.org/drawingml/2006/main" xmlns:r="http://schemas.openxmlformats.org/officeDocument/2006/relationships" xmlns:p="http://schemas.openxmlformats.org/presentationml/2006/main">
   <p:cSld>
     <p:spTree>
@@ -5431,7 +6301,7 @@
 </p:sld>
 </file>
 
-<file path=ppt/slides/slide12.xml><?xml version="1.0" encoding="utf-8"?>
+<file path=ppt/slides/slide17.xml><?xml version="1.0" encoding="utf-8"?>
 <p:sld xmlns:a="http://schemas.openxmlformats.org/drawingml/2006/main" xmlns:r="http://schemas.openxmlformats.org/officeDocument/2006/relationships" xmlns:p="http://schemas.openxmlformats.org/presentationml/2006/main">
   <p:cSld>
     <p:spTree>
@@ -6250,7 +7120,7 @@
 </p:sld>
 </file>
 
-<file path=ppt/slides/slide13.xml><?xml version="1.0" encoding="utf-8"?>
+<file path=ppt/slides/slide18.xml><?xml version="1.0" encoding="utf-8"?>
 <p:sld xmlns:a="http://schemas.openxmlformats.org/drawingml/2006/main" xmlns:r="http://schemas.openxmlformats.org/officeDocument/2006/relationships" xmlns:p="http://schemas.openxmlformats.org/presentationml/2006/main">
   <p:cSld>
     <p:spTree>
@@ -6279,12 +7149,26 @@
         </p:nvSpPr>
         <p:spPr/>
         <p:txBody>
-          <a:bodyPr/>
-          <a:lstStyle/>
-          <a:p>
-            <a:r>
-              <a:rPr lang="de-CH" dirty="0" smtClean="0"/>
-              <a:t>Play Framework - Praxis Fazit</a:t>
+          <a:bodyPr>
+            <a:normAutofit fontScale="90000"/>
+          </a:bodyPr>
+          <a:lstStyle/>
+          <a:p>
+            <a:r>
+              <a:rPr lang="de-CH" dirty="0" smtClean="0"/>
+              <a:t>Play Framework - Praxis </a:t>
+            </a:r>
+            <a:r>
+              <a:rPr lang="de-CH" dirty="0" err="1" smtClean="0"/>
+              <a:t>Lessons</a:t>
+            </a:r>
+            <a:r>
+              <a:rPr lang="de-CH" dirty="0" smtClean="0"/>
+              <a:t> </a:t>
+            </a:r>
+            <a:r>
+              <a:rPr lang="de-CH" dirty="0" err="1" smtClean="0"/>
+              <a:t>Learnt</a:t>
             </a:r>
             <a:endParaRPr lang="de-CH" dirty="0"/>
           </a:p>
@@ -6374,7 +7258,7 @@
 </p:sld>
 </file>
 
-<file path=ppt/slides/slide14.xml><?xml version="1.0" encoding="utf-8"?>
+<file path=ppt/slides/slide19.xml><?xml version="1.0" encoding="utf-8"?>
 <p:sld xmlns:a="http://schemas.openxmlformats.org/drawingml/2006/main" xmlns:r="http://schemas.openxmlformats.org/officeDocument/2006/relationships" xmlns:p="http://schemas.openxmlformats.org/presentationml/2006/main">
   <p:cSld>
     <p:spTree>
@@ -6408,11 +7292,7 @@
           <a:p>
             <a:r>
               <a:rPr lang="de-CH" dirty="0" smtClean="0"/>
-              <a:t>Play Framework - </a:t>
-            </a:r>
-            <a:r>
-              <a:rPr lang="de-CH" dirty="0" smtClean="0"/>
-              <a:t>Links</a:t>
+              <a:t>Play Framework - Links</a:t>
             </a:r>
             <a:endParaRPr lang="de-CH" dirty="0"/>
           </a:p>
@@ -6524,18 +7404,7 @@
           <a:p>
             <a:r>
               <a:rPr lang="de-CH" dirty="0" smtClean="0"/>
-              <a:t>Technologie-Übersicht </a:t>
-            </a:r>
-            <a:r>
-              <a:rPr lang="de-CH" dirty="0" smtClean="0">
-                <a:solidFill>
-                  <a:schemeClr val="accent1">
-                    <a:lumMod val="60000"/>
-                    <a:lumOff val="40000"/>
-                  </a:schemeClr>
-                </a:solidFill>
-              </a:rPr>
-              <a:t>clientseitig</a:t>
+              <a:t>Features Shop-Frontend</a:t>
             </a:r>
             <a:endParaRPr lang="de-CH" dirty="0">
               <a:solidFill>
@@ -6567,61 +7436,68 @@
           <a:p>
             <a:r>
               <a:rPr lang="de-CH" dirty="0" smtClean="0"/>
-              <a:t>Bootstrap CSS </a:t>
-            </a:r>
-            <a:r>
-              <a:rPr lang="de-CH" dirty="0"/>
-              <a:t>Framework + </a:t>
-            </a:r>
-            <a:r>
-              <a:rPr lang="de-CH" dirty="0" err="1"/>
-              <a:t>Javascript</a:t>
-            </a:r>
-            <a:r>
-              <a:rPr lang="de-CH" dirty="0"/>
-              <a:t> </a:t>
-            </a:r>
-            <a:r>
-              <a:rPr lang="de-CH" dirty="0" smtClean="0"/>
-              <a:t>Helpers</a:t>
+              <a:t>Statische mehrsprachig erfassbare Seiten</a:t>
+            </a:r>
+          </a:p>
+          <a:p>
+            <a:pPr lvl="1"/>
+            <a:r>
+              <a:rPr lang="de-CH" dirty="0" smtClean="0"/>
+              <a:t>Z.B. für </a:t>
+            </a:r>
+            <a:r>
+              <a:rPr lang="de-CH" dirty="0" err="1" smtClean="0"/>
+              <a:t>Impressium</a:t>
+            </a:r>
+            <a:r>
+              <a:rPr lang="de-CH" dirty="0" smtClean="0"/>
+              <a:t>, etc.</a:t>
             </a:r>
             <a:endParaRPr lang="de-CH" dirty="0" smtClean="0"/>
           </a:p>
           <a:p>
+            <a:r>
+              <a:rPr lang="de-CH" dirty="0" smtClean="0"/>
+              <a:t>Artikel-Kollektion</a:t>
+            </a:r>
+          </a:p>
+          <a:p>
             <a:pPr lvl="1"/>
             <a:r>
-              <a:rPr lang="de-CH" dirty="0" smtClean="0"/>
-              <a:t>Für einfachere Implementation eines attraktiven, </a:t>
-            </a:r>
-            <a:r>
               <a:rPr lang="de-CH" dirty="0" err="1" smtClean="0"/>
-              <a:t>responsive</a:t>
-            </a:r>
-            <a:r>
-              <a:rPr lang="de-CH" dirty="0" smtClean="0"/>
-              <a:t> Designs</a:t>
+              <a:t>z.B</a:t>
+            </a:r>
+            <a:r>
+              <a:rPr lang="de-CH" dirty="0" smtClean="0"/>
+              <a:t> Praline, Marmeladen</a:t>
+            </a:r>
+          </a:p>
+          <a:p>
+            <a:r>
+              <a:rPr lang="de-CH" dirty="0" smtClean="0"/>
+              <a:t>Anzeige einzelner Artikel mit Bild</a:t>
+            </a:r>
+          </a:p>
+          <a:p>
+            <a:r>
+              <a:rPr lang="de-CH" dirty="0" smtClean="0"/>
+              <a:t>Warenkorb </a:t>
             </a:r>
           </a:p>
           <a:p>
             <a:pPr lvl="1"/>
             <a:r>
-              <a:rPr lang="de-CH" dirty="0" smtClean="0">
-                <a:hlinkClick r:id="rId2"/>
-              </a:rPr>
-              <a:t>http</a:t>
-            </a:r>
-            <a:r>
-              <a:rPr lang="de-CH" dirty="0">
-                <a:hlinkClick r:id="rId2"/>
-              </a:rPr>
-              <a:t>://</a:t>
-            </a:r>
-            <a:r>
-              <a:rPr lang="de-CH" dirty="0" smtClean="0">
-                <a:hlinkClick r:id="rId2"/>
-              </a:rPr>
-              <a:t>getbootstrap.com</a:t>
-            </a:r>
+              <a:rPr lang="de-CH" dirty="0" smtClean="0"/>
+              <a:t>Laden/Speichern per AJAX via REST-API</a:t>
+            </a:r>
+          </a:p>
+          <a:p>
+            <a:r>
+              <a:rPr lang="de-CH" dirty="0" smtClean="0"/>
+              <a:t>Unterstützung für beliebig viele Sprachen (zur Zeit Deutsch / English effektiv aktiviert)</a:t>
+            </a:r>
+          </a:p>
+          <a:p>
             <a:endParaRPr lang="de-CH" dirty="0" smtClean="0"/>
           </a:p>
         </p:txBody>
@@ -6672,19 +7548,8 @@
           <a:lstStyle/>
           <a:p>
             <a:r>
-              <a:rPr lang="de-CH" dirty="0" smtClean="0"/>
-              <a:t>Technologie-Übersicht </a:t>
-            </a:r>
-            <a:r>
-              <a:rPr lang="de-CH" dirty="0" smtClean="0">
-                <a:solidFill>
-                  <a:schemeClr val="accent1">
-                    <a:lumMod val="60000"/>
-                    <a:lumOff val="40000"/>
-                  </a:schemeClr>
-                </a:solidFill>
-              </a:rPr>
-              <a:t>clientseitig</a:t>
+              <a:rPr lang="de-CH" dirty="0"/>
+              <a:t>Features Shop-Frontend</a:t>
             </a:r>
             <a:endParaRPr lang="de-CH" dirty="0">
               <a:solidFill>
@@ -6715,71 +7580,82 @@
           <a:lstStyle/>
           <a:p>
             <a:r>
+              <a:rPr lang="de-CH" dirty="0" smtClean="0"/>
+              <a:t>Registrierung inklusive </a:t>
+            </a:r>
+            <a:r>
               <a:rPr lang="de-CH" dirty="0" err="1" smtClean="0"/>
-              <a:t>JQuery</a:t>
+              <a:t>Verification</a:t>
+            </a:r>
+            <a:r>
+              <a:rPr lang="de-CH" dirty="0" smtClean="0"/>
+              <a:t>-Email</a:t>
+            </a:r>
+          </a:p>
+          <a:p>
+            <a:pPr lvl="1"/>
+            <a:r>
+              <a:rPr lang="de-CH" dirty="0" smtClean="0"/>
+              <a:t>E-Mail wird in Demo einfach in Konsole ausgegeben, da kein SMTP hinterlegt in </a:t>
+            </a:r>
+            <a:r>
+              <a:rPr lang="de-CH" dirty="0" err="1" smtClean="0"/>
+              <a:t>Config</a:t>
+            </a:r>
+            <a:r>
+              <a:rPr lang="de-CH" dirty="0" smtClean="0"/>
+              <a:t>.</a:t>
+            </a:r>
+          </a:p>
+          <a:p>
+            <a:r>
+              <a:rPr lang="de-CH" dirty="0" smtClean="0"/>
+              <a:t>Login mit Passwort-Vergessen Funktion</a:t>
+            </a:r>
+          </a:p>
+          <a:p>
+            <a:r>
+              <a:rPr lang="de-CH" dirty="0" err="1" smtClean="0"/>
+              <a:t>Registierung</a:t>
+            </a:r>
+            <a:r>
+              <a:rPr lang="de-CH" dirty="0" smtClean="0"/>
+              <a:t>/Login ebenfalls über </a:t>
+            </a:r>
+            <a:r>
+              <a:rPr lang="de-CH" dirty="0" err="1" smtClean="0"/>
+              <a:t>Oauth</a:t>
+            </a:r>
+            <a:r>
+              <a:rPr lang="de-CH" dirty="0" smtClean="0"/>
+              <a:t>/</a:t>
+            </a:r>
+            <a:r>
+              <a:rPr lang="de-CH" dirty="0" err="1" smtClean="0"/>
+              <a:t>Oauth</a:t>
+            </a:r>
+            <a:r>
+              <a:rPr lang="de-CH" dirty="0" smtClean="0"/>
+              <a:t> 2.0 möglich</a:t>
+            </a:r>
+          </a:p>
+          <a:p>
+            <a:pPr lvl="1"/>
+            <a:r>
+              <a:rPr lang="de-CH" dirty="0" smtClean="0"/>
+              <a:t>Derzeit ist bei Google und Facebook ein Client-Token gelöst für </a:t>
+            </a:r>
+            <a:r>
+              <a:rPr lang="de-CH" dirty="0" err="1" smtClean="0"/>
+              <a:t>localhost</a:t>
+            </a:r>
+            <a:r>
+              <a:rPr lang="de-CH" dirty="0" smtClean="0"/>
+              <a:t>-URL</a:t>
             </a:r>
             <a:endParaRPr lang="de-CH" dirty="0" smtClean="0"/>
           </a:p>
           <a:p>
-            <a:pPr lvl="1"/>
-            <a:r>
-              <a:rPr lang="de-CH" dirty="0" smtClean="0"/>
-              <a:t>Vereinfachte DOM-Manipulationen</a:t>
-            </a:r>
-          </a:p>
-          <a:p>
-            <a:pPr lvl="1"/>
-            <a:r>
-              <a:rPr lang="de-CH" dirty="0" smtClean="0"/>
-              <a:t>Einheitliche, browser</a:t>
-            </a:r>
-            <a:r>
-              <a:rPr lang="de-CH" dirty="0"/>
-              <a:t>-</a:t>
-            </a:r>
-            <a:r>
-              <a:rPr lang="de-CH" dirty="0" smtClean="0"/>
-              <a:t>unabhängige AJAX-</a:t>
-            </a:r>
-            <a:r>
-              <a:rPr lang="de-CH" dirty="0" err="1" smtClean="0"/>
-              <a:t>Requests</a:t>
-            </a:r>
-            <a:endParaRPr lang="de-CH" dirty="0" smtClean="0"/>
-          </a:p>
-          <a:p>
-            <a:pPr lvl="1"/>
-            <a:r>
-              <a:rPr lang="de-CH" dirty="0" smtClean="0"/>
-              <a:t>Diverse GUI-Features wie </a:t>
-            </a:r>
-            <a:r>
-              <a:rPr lang="de-CH" dirty="0" err="1" smtClean="0"/>
-              <a:t>Tabpages</a:t>
-            </a:r>
-            <a:r>
-              <a:rPr lang="de-CH" dirty="0" smtClean="0"/>
-              <a:t>, Modal-Dialoge, etc.</a:t>
-            </a:r>
-          </a:p>
-          <a:p>
-            <a:pPr lvl="1"/>
-            <a:r>
-              <a:rPr lang="de-CH" dirty="0" smtClean="0">
-                <a:hlinkClick r:id="rId2"/>
-              </a:rPr>
-              <a:t>http</a:t>
-            </a:r>
-            <a:r>
-              <a:rPr lang="de-CH" dirty="0">
-                <a:hlinkClick r:id="rId2"/>
-              </a:rPr>
-              <a:t>://jquery.com/</a:t>
-            </a:r>
-            <a:endParaRPr lang="de-CH" dirty="0"/>
-          </a:p>
-          <a:p>
-            <a:pPr lvl="1"/>
             <a:endParaRPr lang="de-CH" dirty="0" smtClean="0"/>
           </a:p>
         </p:txBody>
@@ -6787,7 +7663,7 @@
     </p:spTree>
     <p:extLst>
       <p:ext uri="{BB962C8B-B14F-4D97-AF65-F5344CB8AC3E}">
-        <p14:creationId xmlns:p14="http://schemas.microsoft.com/office/powerpoint/2010/main" val="893446869"/>
+        <p14:creationId xmlns:p14="http://schemas.microsoft.com/office/powerpoint/2010/main" val="1734327681"/>
       </p:ext>
     </p:extLst>
   </p:cSld>
@@ -6830,19 +7706,8 @@
           <a:lstStyle/>
           <a:p>
             <a:r>
-              <a:rPr lang="de-CH" dirty="0" smtClean="0"/>
-              <a:t>Technologie-Übersicht </a:t>
-            </a:r>
-            <a:r>
-              <a:rPr lang="de-CH" dirty="0" smtClean="0">
-                <a:solidFill>
-                  <a:schemeClr val="accent1">
-                    <a:lumMod val="60000"/>
-                    <a:lumOff val="40000"/>
-                  </a:schemeClr>
-                </a:solidFill>
-              </a:rPr>
-              <a:t>clientseitig</a:t>
+              <a:rPr lang="de-CH" dirty="0"/>
+              <a:t>Features Shop-Frontend</a:t>
             </a:r>
             <a:endParaRPr lang="de-CH" dirty="0">
               <a:solidFill>
@@ -6868,91 +7733,47 @@
         <p:spPr/>
         <p:txBody>
           <a:bodyPr>
-            <a:normAutofit fontScale="92500" lnSpcReduction="10000"/>
+            <a:normAutofit/>
           </a:bodyPr>
           <a:lstStyle/>
           <a:p>
             <a:r>
               <a:rPr lang="de-CH" dirty="0" smtClean="0"/>
-              <a:t>Knockout </a:t>
-            </a:r>
-            <a:r>
-              <a:rPr lang="de-CH" dirty="0" err="1"/>
-              <a:t>Javascript</a:t>
-            </a:r>
-            <a:r>
-              <a:rPr lang="de-CH" dirty="0"/>
-              <a:t> </a:t>
-            </a:r>
-            <a:r>
-              <a:rPr lang="de-CH" dirty="0" smtClean="0"/>
-              <a:t>Framework</a:t>
+              <a:t>Bestellung des Warenkorbes auf Rechnung</a:t>
             </a:r>
           </a:p>
           <a:p>
             <a:pPr lvl="1"/>
             <a:r>
               <a:rPr lang="de-CH" dirty="0" smtClean="0"/>
-              <a:t>Vereinfacht die Datenhandhabung</a:t>
+              <a:t>Ort-Eingabe wird mit </a:t>
+            </a:r>
+            <a:r>
+              <a:rPr lang="de-CH" dirty="0" err="1" smtClean="0"/>
+              <a:t>TypeAhead</a:t>
+            </a:r>
+            <a:r>
+              <a:rPr lang="de-CH" dirty="0" smtClean="0"/>
+              <a:t> unterstützt</a:t>
             </a:r>
           </a:p>
           <a:p>
             <a:pPr lvl="1"/>
             <a:r>
               <a:rPr lang="de-CH" dirty="0" smtClean="0"/>
-              <a:t>Im Hintergrund sind Daten in </a:t>
-            </a:r>
-            <a:r>
-              <a:rPr lang="de-CH" dirty="0" err="1" smtClean="0"/>
-              <a:t>Javascript</a:t>
-            </a:r>
-            <a:r>
-              <a:rPr lang="de-CH" dirty="0" smtClean="0"/>
-              <a:t> </a:t>
-            </a:r>
-            <a:r>
-              <a:rPr lang="de-CH" dirty="0" err="1" smtClean="0"/>
-              <a:t>Variabeln</a:t>
-            </a:r>
-            <a:r>
-              <a:rPr lang="de-CH" dirty="0" smtClean="0"/>
-              <a:t> als Objekt und/oder Listenstrukturen abgebildet</a:t>
-            </a:r>
-          </a:p>
-          <a:p>
-            <a:pPr lvl="1"/>
-            <a:r>
-              <a:rPr lang="de-CH" dirty="0" smtClean="0"/>
-              <a:t>Auf HTML Elemente kann eine </a:t>
-            </a:r>
-            <a:r>
-              <a:rPr lang="de-CH" dirty="0" err="1" smtClean="0"/>
-              <a:t>data</a:t>
-            </a:r>
-            <a:r>
-              <a:rPr lang="de-CH" dirty="0" smtClean="0"/>
-              <a:t>-bind auf ein Datenelement der Hintergrunddaten gelegt werden. Sobald im Hintergrund der Inhalt der Variable gewechselt wird, werden alle GUI-Elemente mitaktualisiert, die Daten der entsprechenden Variable anzeigen</a:t>
-            </a:r>
-          </a:p>
-          <a:p>
-            <a:pPr lvl="1"/>
-            <a:r>
-              <a:rPr lang="de-CH" dirty="0" smtClean="0"/>
-              <a:t>Weitere Beschreibung und Download siehe </a:t>
-            </a:r>
-            <a:r>
-              <a:rPr lang="de-CH" dirty="0">
-                <a:hlinkClick r:id="rId2"/>
-              </a:rPr>
-              <a:t>http://knockoutjs.com</a:t>
-            </a:r>
-            <a:r>
-              <a:rPr lang="de-CH" dirty="0" smtClean="0"/>
-              <a:t> </a:t>
-            </a:r>
-          </a:p>
-          <a:p>
-            <a:pPr lvl="1"/>
+              <a:t>Bestellung als PDF abrufbar (ebenfalls in der Benutzersprache)</a:t>
+            </a:r>
+          </a:p>
+          <a:p>
+            <a:r>
+              <a:rPr lang="de-CH" dirty="0" smtClean="0"/>
+              <a:t>Bestellverlauf-Anzeige</a:t>
+            </a:r>
+          </a:p>
+          <a:p>
+            <a:endParaRPr lang="de-CH" dirty="0" smtClean="0"/>
+          </a:p>
+          <a:p>
             <a:endParaRPr lang="de-CH" dirty="0" smtClean="0"/>
           </a:p>
         </p:txBody>
@@ -6960,7 +7781,7 @@
     </p:spTree>
     <p:extLst>
       <p:ext uri="{BB962C8B-B14F-4D97-AF65-F5344CB8AC3E}">
-        <p14:creationId xmlns:p14="http://schemas.microsoft.com/office/powerpoint/2010/main" val="4226246965"/>
+        <p14:creationId xmlns:p14="http://schemas.microsoft.com/office/powerpoint/2010/main" val="3354200192"/>
       </p:ext>
     </p:extLst>
   </p:cSld>
@@ -7003,19 +7824,12 @@
           <a:lstStyle/>
           <a:p>
             <a:r>
-              <a:rPr lang="de-CH" dirty="0" smtClean="0"/>
-              <a:t>Technologie-Übersicht </a:t>
-            </a:r>
-            <a:r>
-              <a:rPr lang="de-CH" dirty="0" smtClean="0">
-                <a:solidFill>
-                  <a:schemeClr val="accent1">
-                    <a:lumMod val="60000"/>
-                    <a:lumOff val="40000"/>
-                  </a:schemeClr>
-                </a:solidFill>
-              </a:rPr>
-              <a:t>clientseitig</a:t>
+              <a:rPr lang="de-CH" dirty="0"/>
+              <a:t>Features </a:t>
+            </a:r>
+            <a:r>
+              <a:rPr lang="de-CH" dirty="0" smtClean="0"/>
+              <a:t>Backend</a:t>
             </a:r>
             <a:endParaRPr lang="de-CH" dirty="0">
               <a:solidFill>
@@ -7046,61 +7860,65 @@
           <a:lstStyle/>
           <a:p>
             <a:r>
-              <a:rPr lang="de-CH" dirty="0" err="1" smtClean="0"/>
-              <a:t>RequireJS</a:t>
-            </a:r>
+              <a:rPr lang="de-CH" dirty="0" smtClean="0"/>
+              <a:t>Anzeige eines Dashboard</a:t>
+            </a:r>
+          </a:p>
+          <a:p>
+            <a:pPr lvl="1"/>
+            <a:r>
+              <a:rPr lang="de-CH" dirty="0" smtClean="0"/>
+              <a:t>Mit den neusten 5 registrieren Benutzer-Adressen</a:t>
+            </a:r>
+          </a:p>
+          <a:p>
+            <a:pPr lvl="1"/>
+            <a:r>
+              <a:rPr lang="de-CH" dirty="0" smtClean="0"/>
+              <a:t>Mit den neusten 5 Bestellungen</a:t>
+            </a:r>
+          </a:p>
+          <a:p>
+            <a:r>
+              <a:rPr lang="de-CH" dirty="0" smtClean="0"/>
+              <a:t>Adress-Modul</a:t>
+            </a:r>
+          </a:p>
+          <a:p>
+            <a:pPr lvl="1"/>
+            <a:r>
+              <a:rPr lang="de-CH" dirty="0" smtClean="0"/>
+              <a:t>Auflisten der Adressen</a:t>
+            </a:r>
+          </a:p>
+          <a:p>
+            <a:pPr lvl="1"/>
+            <a:r>
+              <a:rPr lang="de-CH" dirty="0" smtClean="0"/>
+              <a:t>Erstellen/Editieren/Kopieren/Löschen einer Adresse</a:t>
+            </a:r>
+          </a:p>
+          <a:p>
+            <a:r>
+              <a:rPr lang="de-CH" dirty="0" smtClean="0"/>
+              <a:t>Artikel-Modul</a:t>
+            </a:r>
+          </a:p>
+          <a:p>
+            <a:pPr lvl="1"/>
+            <a:r>
+              <a:rPr lang="de-CH" dirty="0" smtClean="0"/>
+              <a:t>Wie Adress-Modul</a:t>
+            </a:r>
+          </a:p>
+          <a:p>
+            <a:pPr lvl="1"/>
             <a:endParaRPr lang="de-CH" dirty="0" smtClean="0"/>
           </a:p>
           <a:p>
-            <a:pPr lvl="1"/>
-            <a:r>
-              <a:rPr lang="de-CH" dirty="0" smtClean="0"/>
-              <a:t>Dynamisches Nachladen benötigter JavaScript-Dateien</a:t>
-            </a:r>
-          </a:p>
-          <a:p>
-            <a:pPr lvl="1"/>
-            <a:r>
-              <a:rPr lang="de-CH" dirty="0" err="1" smtClean="0"/>
-              <a:t>Dependency-Manangement</a:t>
-            </a:r>
-            <a:r>
-              <a:rPr lang="de-CH" dirty="0" smtClean="0"/>
-              <a:t>, um sicherzustellen, dass Ladereihenfolge der </a:t>
-            </a:r>
-            <a:r>
-              <a:rPr lang="de-CH" dirty="0" err="1" smtClean="0"/>
-              <a:t>Javascript</a:t>
-            </a:r>
-            <a:r>
-              <a:rPr lang="de-CH" dirty="0" smtClean="0"/>
-              <a:t>-Dateien korrekt ist</a:t>
-            </a:r>
-          </a:p>
-          <a:p>
-            <a:pPr lvl="1"/>
-            <a:r>
-              <a:rPr lang="de-CH" dirty="0" smtClean="0"/>
-              <a:t>Dank </a:t>
-            </a:r>
-            <a:r>
-              <a:rPr lang="de-CH" dirty="0" err="1" smtClean="0"/>
-              <a:t>RequireJS</a:t>
-            </a:r>
-            <a:r>
-              <a:rPr lang="de-CH" dirty="0" smtClean="0"/>
-              <a:t> ist im effektiven HTML-Dokument nur noch ein Script-Tag nötig: Den auf RequireJS.js</a:t>
-            </a:r>
-            <a:endParaRPr lang="de-CH" dirty="0"/>
-          </a:p>
-          <a:p>
-            <a:pPr lvl="1"/>
-            <a:r>
-              <a:rPr lang="de-CH" dirty="0">
-                <a:hlinkClick r:id="rId2"/>
-              </a:rPr>
-              <a:t>http://requirejs.org/</a:t>
-            </a:r>
+            <a:endParaRPr lang="de-CH" dirty="0" smtClean="0"/>
+          </a:p>
+          <a:p>
             <a:endParaRPr lang="de-CH" dirty="0" smtClean="0"/>
           </a:p>
         </p:txBody>
@@ -7108,7 +7926,7 @@
     </p:spTree>
     <p:extLst>
       <p:ext uri="{BB962C8B-B14F-4D97-AF65-F5344CB8AC3E}">
-        <p14:creationId xmlns:p14="http://schemas.microsoft.com/office/powerpoint/2010/main" val="1475712476"/>
+        <p14:creationId xmlns:p14="http://schemas.microsoft.com/office/powerpoint/2010/main" val="1403545292"/>
       </p:ext>
     </p:extLst>
   </p:cSld>
@@ -7151,19 +7969,12 @@
           <a:lstStyle/>
           <a:p>
             <a:r>
-              <a:rPr lang="de-CH" dirty="0" smtClean="0"/>
-              <a:t>Technologie-Übersicht </a:t>
-            </a:r>
-            <a:r>
-              <a:rPr lang="de-CH" dirty="0" smtClean="0">
-                <a:solidFill>
-                  <a:schemeClr val="accent1">
-                    <a:lumMod val="60000"/>
-                    <a:lumOff val="40000"/>
-                  </a:schemeClr>
-                </a:solidFill>
-              </a:rPr>
-              <a:t>clientseitig</a:t>
+              <a:rPr lang="de-CH" dirty="0"/>
+              <a:t>Features </a:t>
+            </a:r>
+            <a:r>
+              <a:rPr lang="de-CH" dirty="0" smtClean="0"/>
+              <a:t>Backend</a:t>
             </a:r>
             <a:endParaRPr lang="de-CH" dirty="0">
               <a:solidFill>
@@ -7194,16 +8005,16 @@
           <a:lstStyle/>
           <a:p>
             <a:r>
+              <a:rPr lang="de-CH" dirty="0" smtClean="0"/>
+              <a:t>Backend ist mit </a:t>
+            </a:r>
+            <a:r>
               <a:rPr lang="de-CH" dirty="0" err="1" smtClean="0"/>
               <a:t>Durandal</a:t>
             </a:r>
-            <a:endParaRPr lang="de-CH" dirty="0" smtClean="0"/>
-          </a:p>
-          <a:p>
-            <a:pPr lvl="1"/>
-            <a:r>
-              <a:rPr lang="de-CH" dirty="0" smtClean="0"/>
-              <a:t>Ermöglicht es, </a:t>
+            <a:r>
+              <a:rPr lang="de-CH" dirty="0" smtClean="0"/>
+              <a:t> als </a:t>
             </a:r>
             <a:r>
               <a:rPr lang="de-CH" dirty="0" err="1" smtClean="0"/>
@@ -7211,83 +8022,66 @@
             </a:r>
             <a:r>
               <a:rPr lang="de-CH" dirty="0" smtClean="0"/>
-              <a:t>-Websites zu erstellen</a:t>
+              <a:t>-Applikation umgesetzt</a:t>
             </a:r>
           </a:p>
           <a:p>
             <a:pPr lvl="1"/>
             <a:r>
               <a:rPr lang="de-CH" dirty="0" smtClean="0"/>
-              <a:t>Einzelne Seiten werden mittels Hashtag in der URL referenziert, </a:t>
-            </a:r>
-            <a:r>
-              <a:rPr lang="de-CH" dirty="0" err="1" smtClean="0"/>
-              <a:t>z.B</a:t>
-            </a:r>
-            <a:r>
-              <a:rPr lang="de-CH" dirty="0" smtClean="0"/>
-              <a:t>: http</a:t>
+              <a:t>URL: </a:t>
             </a:r>
             <a:r>
               <a:rPr lang="de-CH" dirty="0" smtClean="0">
-                <a:sym typeface="Wingdings" panose="05000000000000000000" pitchFamily="2" charset="2"/>
-              </a:rPr>
-              <a:t>://localhost:9000/backend#adressen </a:t>
-            </a:r>
-          </a:p>
-          <a:p>
-            <a:pPr lvl="1"/>
-            <a:r>
-              <a:rPr lang="de-CH" dirty="0" smtClean="0">
-                <a:sym typeface="Wingdings" panose="05000000000000000000" pitchFamily="2" charset="2"/>
-              </a:rPr>
-              <a:t>Ist ein Zusammenzu</a:t>
-            </a:r>
-            <a:r>
-              <a:rPr lang="de-CH" dirty="0" smtClean="0">
-                <a:sym typeface="Wingdings" panose="05000000000000000000" pitchFamily="2" charset="2"/>
-              </a:rPr>
-              <a:t>g von </a:t>
-            </a:r>
-            <a:r>
-              <a:rPr lang="de-CH" dirty="0" err="1" smtClean="0">
-                <a:sym typeface="Wingdings" panose="05000000000000000000" pitchFamily="2" charset="2"/>
-              </a:rPr>
-              <a:t>JQuery</a:t>
-            </a:r>
-            <a:r>
-              <a:rPr lang="de-CH" dirty="0" smtClean="0">
-                <a:sym typeface="Wingdings" panose="05000000000000000000" pitchFamily="2" charset="2"/>
-              </a:rPr>
-              <a:t>, Knockout, </a:t>
-            </a:r>
-            <a:r>
-              <a:rPr lang="de-CH" dirty="0" err="1" smtClean="0">
-                <a:sym typeface="Wingdings" panose="05000000000000000000" pitchFamily="2" charset="2"/>
-              </a:rPr>
-              <a:t>RequireJS</a:t>
-            </a:r>
-            <a:r>
-              <a:rPr lang="de-CH" dirty="0" smtClean="0">
-                <a:sym typeface="Wingdings" panose="05000000000000000000" pitchFamily="2" charset="2"/>
-              </a:rPr>
-              <a:t> und Teilen von Backbone</a:t>
-            </a:r>
-          </a:p>
-          <a:p>
-            <a:pPr lvl="1"/>
-            <a:r>
-              <a:rPr lang="de-CH" dirty="0">
                 <a:hlinkClick r:id="rId2"/>
               </a:rPr>
-              <a:t>http://durandaljs.com/</a:t>
+              <a:t>http://localhost:9000/backend</a:t>
+            </a:r>
+            <a:endParaRPr lang="de-CH" dirty="0" smtClean="0"/>
+          </a:p>
+          <a:p>
+            <a:pPr lvl="1"/>
+            <a:r>
+              <a:rPr lang="de-CH" dirty="0" smtClean="0"/>
+              <a:t>Zugriff nur durch Administrator-Benutzer möglich</a:t>
+            </a:r>
+          </a:p>
+          <a:p>
+            <a:pPr lvl="2"/>
+            <a:r>
+              <a:rPr lang="de-CH" dirty="0" err="1" smtClean="0"/>
+              <a:t>Z.b.</a:t>
+            </a:r>
+            <a:r>
+              <a:rPr lang="de-CH" dirty="0" smtClean="0"/>
+              <a:t> </a:t>
             </a:r>
             <a:r>
               <a:rPr lang="de-CH" dirty="0" smtClean="0">
-                <a:sym typeface="Wingdings" panose="05000000000000000000" pitchFamily="2" charset="2"/>
+                <a:hlinkClick r:id="rId3"/>
               </a:rPr>
-              <a:t> </a:t>
-            </a:r>
+              <a:t>nicole.berger@nb-pralinen.ch</a:t>
+            </a:r>
+            <a:r>
+              <a:rPr lang="de-CH" dirty="0" smtClean="0"/>
+              <a:t> mit PW </a:t>
+            </a:r>
+            <a:r>
+              <a:rPr lang="de-CH" dirty="0" err="1" smtClean="0"/>
+              <a:t>praline</a:t>
+            </a:r>
+            <a:endParaRPr lang="de-CH" dirty="0" smtClean="0"/>
+          </a:p>
+          <a:p>
+            <a:r>
+              <a:rPr lang="de-CH" dirty="0" smtClean="0"/>
+              <a:t>Laden/Speichern aller Daten erfolgt vollständig per AJAX via der eigenen REST-API http://localhost:9000/api</a:t>
+            </a:r>
+          </a:p>
+          <a:p>
+            <a:endParaRPr lang="de-CH" dirty="0" smtClean="0"/>
+          </a:p>
+          <a:p>
             <a:endParaRPr lang="de-CH" dirty="0" smtClean="0"/>
           </a:p>
         </p:txBody>
@@ -7295,7 +8089,7 @@
     </p:spTree>
     <p:extLst>
       <p:ext uri="{BB962C8B-B14F-4D97-AF65-F5344CB8AC3E}">
-        <p14:creationId xmlns:p14="http://schemas.microsoft.com/office/powerpoint/2010/main" val="3553915380"/>
+        <p14:creationId xmlns:p14="http://schemas.microsoft.com/office/powerpoint/2010/main" val="3311186290"/>
       </p:ext>
     </p:extLst>
   </p:cSld>
@@ -7381,38 +8175,61 @@
           <a:lstStyle/>
           <a:p>
             <a:r>
+              <a:rPr lang="de-CH" dirty="0" smtClean="0"/>
+              <a:t>Bootstrap CSS </a:t>
+            </a:r>
+            <a:r>
+              <a:rPr lang="de-CH" dirty="0"/>
+              <a:t>Framework + </a:t>
+            </a:r>
+            <a:r>
+              <a:rPr lang="de-CH" dirty="0" err="1"/>
+              <a:t>Javascript</a:t>
+            </a:r>
+            <a:r>
+              <a:rPr lang="de-CH" dirty="0"/>
+              <a:t> </a:t>
+            </a:r>
+            <a:r>
+              <a:rPr lang="de-CH" dirty="0" smtClean="0"/>
+              <a:t>Helpers</a:t>
+            </a:r>
+          </a:p>
+          <a:p>
+            <a:pPr lvl="1"/>
+            <a:r>
+              <a:rPr lang="de-CH" dirty="0" smtClean="0"/>
+              <a:t>Für einfachere Implementation eines attraktiven, </a:t>
+            </a:r>
+            <a:r>
               <a:rPr lang="de-CH" dirty="0" err="1" smtClean="0"/>
-              <a:t>TypeAhead</a:t>
-            </a:r>
-            <a:endParaRPr lang="de-CH" dirty="0" smtClean="0"/>
+              <a:t>responsive</a:t>
+            </a:r>
+            <a:r>
+              <a:rPr lang="de-CH" dirty="0" smtClean="0"/>
+              <a:t> Designs</a:t>
+            </a:r>
           </a:p>
           <a:p>
             <a:pPr lvl="1"/>
             <a:r>
-              <a:rPr lang="de-CH" dirty="0" err="1" smtClean="0"/>
-              <a:t>TypeAhead</a:t>
-            </a:r>
-            <a:r>
-              <a:rPr lang="de-CH" dirty="0" smtClean="0"/>
-              <a:t> Input-Feld von den Twitter Jungs</a:t>
-            </a:r>
-          </a:p>
-          <a:p>
-            <a:pPr lvl="1"/>
-            <a:r>
-              <a:rPr lang="de-CH" dirty="0" smtClean="0"/>
-              <a:t>Demo siehe </a:t>
+              <a:rPr lang="de-CH" dirty="0" smtClean="0">
+                <a:hlinkClick r:id="rId2"/>
+              </a:rPr>
+              <a:t>http</a:t>
             </a:r>
             <a:r>
               <a:rPr lang="de-CH" dirty="0">
                 <a:hlinkClick r:id="rId2"/>
               </a:rPr>
-              <a:t>http://twitter.github.io/typeahead.js/</a:t>
-            </a:r>
-            <a:endParaRPr lang="de-CH" dirty="0" smtClean="0"/>
-          </a:p>
-          <a:p>
-            <a:pPr lvl="1"/>
+              <a:t>://</a:t>
+            </a:r>
+            <a:r>
+              <a:rPr lang="de-CH" dirty="0" smtClean="0">
+                <a:hlinkClick r:id="rId2"/>
+              </a:rPr>
+              <a:t>getbootstrap.com</a:t>
+            </a:r>
             <a:endParaRPr lang="de-CH" dirty="0" smtClean="0"/>
           </a:p>
         </p:txBody>
@@ -7420,7 +8237,7 @@
     </p:spTree>
     <p:extLst>
       <p:ext uri="{BB962C8B-B14F-4D97-AF65-F5344CB8AC3E}">
-        <p14:creationId xmlns:p14="http://schemas.microsoft.com/office/powerpoint/2010/main" val="172362945"/>
+        <p14:creationId xmlns:p14="http://schemas.microsoft.com/office/powerpoint/2010/main" val="2463138761"/>
       </p:ext>
     </p:extLst>
   </p:cSld>
@@ -7475,7 +8292,7 @@
                   </a:schemeClr>
                 </a:solidFill>
               </a:rPr>
-              <a:t>serverseitig</a:t>
+              <a:t>clientseitig</a:t>
             </a:r>
             <a:endParaRPr lang="de-CH" dirty="0">
               <a:solidFill>
@@ -7500,146 +8317,85 @@
         </p:nvSpPr>
         <p:spPr/>
         <p:txBody>
-          <a:bodyPr/>
-          <a:lstStyle/>
-          <a:p>
-            <a:r>
-              <a:rPr lang="de-CH" dirty="0" smtClean="0"/>
-              <a:t>Play Framework (</a:t>
-            </a:r>
-            <a:r>
-              <a:rPr lang="de-CH" dirty="0" smtClean="0"/>
-              <a:t>Java)</a:t>
-            </a:r>
-          </a:p>
-          <a:p>
-            <a:r>
-              <a:rPr lang="de-CH" dirty="0" smtClean="0"/>
-              <a:t>Der Framework b</a:t>
-            </a:r>
-            <a:r>
-              <a:rPr lang="de-CH" dirty="0" smtClean="0"/>
-              <a:t>esteht intern aus:</a:t>
+          <a:bodyPr>
+            <a:normAutofit/>
+          </a:bodyPr>
+          <a:lstStyle/>
+          <a:p>
+            <a:r>
+              <a:rPr lang="de-CH" dirty="0" err="1" smtClean="0"/>
+              <a:t>JQuery</a:t>
             </a:r>
             <a:endParaRPr lang="de-CH" dirty="0" smtClean="0"/>
           </a:p>
           <a:p>
             <a:pPr lvl="1"/>
             <a:r>
+              <a:rPr lang="de-CH" dirty="0" smtClean="0"/>
+              <a:t>Vereinfachte DOM-Manipulationen</a:t>
+            </a:r>
+          </a:p>
+          <a:p>
+            <a:pPr lvl="1"/>
+            <a:r>
+              <a:rPr lang="de-CH" dirty="0" smtClean="0"/>
+              <a:t>Einheitliche, browser</a:t>
+            </a:r>
+            <a:r>
+              <a:rPr lang="de-CH" dirty="0"/>
+              <a:t>-</a:t>
+            </a:r>
+            <a:r>
+              <a:rPr lang="de-CH" dirty="0" smtClean="0"/>
+              <a:t>unabhängige AJAX-</a:t>
+            </a:r>
+            <a:r>
               <a:rPr lang="de-CH" dirty="0" err="1" smtClean="0"/>
-              <a:t>Jetty</a:t>
-            </a:r>
-            <a:r>
-              <a:rPr lang="de-CH" dirty="0" smtClean="0"/>
-              <a:t> HTTP-Server</a:t>
-            </a:r>
+              <a:t>Requests</a:t>
+            </a:r>
+            <a:endParaRPr lang="de-CH" dirty="0" smtClean="0"/>
           </a:p>
           <a:p>
             <a:pPr lvl="1"/>
             <a:r>
+              <a:rPr lang="de-CH" dirty="0" smtClean="0"/>
+              <a:t>Diverse GUI-Features wie </a:t>
+            </a:r>
+            <a:r>
               <a:rPr lang="de-CH" dirty="0" err="1" smtClean="0"/>
-              <a:t>Ebean</a:t>
-            </a:r>
-            <a:r>
-              <a:rPr lang="de-CH" dirty="0" smtClean="0"/>
-              <a:t> ORM </a:t>
-            </a:r>
+              <a:t>Tabpages</a:t>
+            </a:r>
+            <a:r>
+              <a:rPr lang="de-CH" dirty="0" smtClean="0"/>
+              <a:t>, Modal-Dialoge, etc.</a:t>
+            </a:r>
+          </a:p>
+          <a:p>
+            <a:pPr lvl="1"/>
             <a:r>
               <a:rPr lang="de-CH" dirty="0" smtClean="0">
-                <a:sym typeface="Wingdings" panose="05000000000000000000" pitchFamily="2" charset="2"/>
+                <a:hlinkClick r:id="rId2"/>
               </a:rPr>
-              <a:t> JDBC  MySQL</a:t>
-            </a:r>
-          </a:p>
-          <a:p>
-            <a:pPr lvl="1"/>
-            <a:r>
-              <a:rPr lang="de-CH" dirty="0" smtClean="0">
-                <a:sym typeface="Wingdings" panose="05000000000000000000" pitchFamily="2" charset="2"/>
-              </a:rPr>
-              <a:t>SBT-</a:t>
-            </a:r>
-            <a:r>
-              <a:rPr lang="de-CH" dirty="0" err="1" smtClean="0">
-                <a:sym typeface="Wingdings" panose="05000000000000000000" pitchFamily="2" charset="2"/>
-              </a:rPr>
-              <a:t>Buildsystem</a:t>
-            </a:r>
-            <a:r>
-              <a:rPr lang="de-CH" dirty="0" smtClean="0">
-                <a:sym typeface="Wingdings" panose="05000000000000000000" pitchFamily="2" charset="2"/>
-              </a:rPr>
-              <a:t> (à la </a:t>
-            </a:r>
-            <a:r>
-              <a:rPr lang="de-CH" dirty="0" err="1" smtClean="0">
-                <a:sym typeface="Wingdings" panose="05000000000000000000" pitchFamily="2" charset="2"/>
-              </a:rPr>
-              <a:t>Maven</a:t>
-            </a:r>
-            <a:r>
-              <a:rPr lang="de-CH" dirty="0" smtClean="0">
-                <a:sym typeface="Wingdings" panose="05000000000000000000" pitchFamily="2" charset="2"/>
-              </a:rPr>
-              <a:t>)</a:t>
-            </a:r>
-          </a:p>
-          <a:p>
-            <a:pPr lvl="1"/>
-            <a:r>
-              <a:rPr lang="de-CH" dirty="0" smtClean="0">
-                <a:sym typeface="Wingdings" panose="05000000000000000000" pitchFamily="2" charset="2"/>
-              </a:rPr>
-              <a:t>Jackson (</a:t>
-            </a:r>
-            <a:r>
-              <a:rPr lang="de-CH" dirty="0" err="1" smtClean="0">
-                <a:sym typeface="Wingdings" panose="05000000000000000000" pitchFamily="2" charset="2"/>
-              </a:rPr>
-              <a:t>Json</a:t>
-            </a:r>
-            <a:r>
-              <a:rPr lang="de-CH" dirty="0" smtClean="0">
-                <a:sym typeface="Wingdings" panose="05000000000000000000" pitchFamily="2" charset="2"/>
-              </a:rPr>
-              <a:t> Parser/</a:t>
-            </a:r>
-            <a:r>
-              <a:rPr lang="de-CH" dirty="0" err="1" smtClean="0">
-                <a:sym typeface="Wingdings" panose="05000000000000000000" pitchFamily="2" charset="2"/>
-              </a:rPr>
-              <a:t>Builder</a:t>
-            </a:r>
-            <a:r>
-              <a:rPr lang="de-CH" dirty="0" smtClean="0">
-                <a:sym typeface="Wingdings" panose="05000000000000000000" pitchFamily="2" charset="2"/>
-              </a:rPr>
-              <a:t>)</a:t>
-            </a:r>
-          </a:p>
-          <a:p>
-            <a:r>
-              <a:rPr lang="de-CH" dirty="0" smtClean="0">
-                <a:sym typeface="Wingdings" panose="05000000000000000000" pitchFamily="2" charset="2"/>
-              </a:rPr>
-              <a:t>Aufbau: </a:t>
+              <a:t>http</a:t>
             </a:r>
             <a:r>
               <a:rPr lang="de-CH" dirty="0">
                 <a:hlinkClick r:id="rId2"/>
               </a:rPr>
-              <a:t>http://www.playframework.com/documentation/2.2.0/Anatomy</a:t>
-            </a:r>
-            <a:endParaRPr lang="de-CH" dirty="0" smtClean="0">
-              <a:sym typeface="Wingdings" panose="05000000000000000000" pitchFamily="2" charset="2"/>
-            </a:endParaRPr>
+              <a:t>://jquery.com/</a:t>
+            </a:r>
+            <a:endParaRPr lang="de-CH" dirty="0"/>
+          </a:p>
+          <a:p>
+            <a:pPr lvl="1"/>
+            <a:endParaRPr lang="de-CH" dirty="0" smtClean="0"/>
           </a:p>
         </p:txBody>
       </p:sp>
     </p:spTree>
     <p:extLst>
       <p:ext uri="{BB962C8B-B14F-4D97-AF65-F5344CB8AC3E}">
-        <p14:creationId xmlns:p14="http://schemas.microsoft.com/office/powerpoint/2010/main" val="3398293374"/>
+        <p14:creationId xmlns:p14="http://schemas.microsoft.com/office/powerpoint/2010/main" val="893446869"/>
       </p:ext>
     </p:extLst>
   </p:cSld>
@@ -7694,7 +8450,7 @@
                   </a:schemeClr>
                 </a:solidFill>
               </a:rPr>
-              <a:t>serverseitig</a:t>
+              <a:t>clientseitig</a:t>
             </a:r>
             <a:endParaRPr lang="de-CH" dirty="0">
               <a:solidFill>
@@ -7719,133 +8475,100 @@
         </p:nvSpPr>
         <p:spPr/>
         <p:txBody>
-          <a:bodyPr/>
-          <a:lstStyle/>
-          <a:p>
-            <a:r>
-              <a:rPr lang="de-CH" dirty="0" smtClean="0"/>
-              <a:t>Play Framework (Java</a:t>
-            </a:r>
-            <a:r>
-              <a:rPr lang="de-CH" dirty="0" smtClean="0"/>
-              <a:t>) ist durch </a:t>
+          <a:bodyPr>
+            <a:normAutofit fontScale="92500" lnSpcReduction="10000"/>
+          </a:bodyPr>
+          <a:lstStyle/>
+          <a:p>
+            <a:r>
+              <a:rPr lang="de-CH" dirty="0" smtClean="0"/>
+              <a:t>Knockout </a:t>
+            </a:r>
+            <a:r>
+              <a:rPr lang="de-CH" dirty="0" err="1"/>
+              <a:t>Javascript</a:t>
+            </a:r>
+            <a:r>
+              <a:rPr lang="de-CH" dirty="0"/>
+              <a:t> </a:t>
+            </a:r>
+            <a:r>
+              <a:rPr lang="de-CH" dirty="0" smtClean="0"/>
+              <a:t>Framework</a:t>
+            </a:r>
+          </a:p>
+          <a:p>
+            <a:pPr lvl="1"/>
+            <a:r>
+              <a:rPr lang="de-CH" dirty="0" smtClean="0"/>
+              <a:t>Vereinfacht die Datenhandhabung</a:t>
+            </a:r>
+          </a:p>
+          <a:p>
+            <a:pPr lvl="1"/>
+            <a:r>
+              <a:rPr lang="de-CH" dirty="0" smtClean="0"/>
+              <a:t>Im Hintergrund sind Daten in </a:t>
             </a:r>
             <a:r>
               <a:rPr lang="de-CH" dirty="0" err="1" smtClean="0"/>
-              <a:t>Plugins</a:t>
-            </a:r>
-            <a:r>
-              <a:rPr lang="de-CH" dirty="0" smtClean="0"/>
-              <a:t> erweiterbar. Zum Beispiel:</a:t>
-            </a:r>
+              <a:t>Javascript</a:t>
+            </a:r>
+            <a:r>
+              <a:rPr lang="de-CH" dirty="0" smtClean="0"/>
+              <a:t> </a:t>
+            </a:r>
+            <a:r>
+              <a:rPr lang="de-CH" dirty="0" err="1" smtClean="0"/>
+              <a:t>Variabeln</a:t>
+            </a:r>
+            <a:r>
+              <a:rPr lang="de-CH" dirty="0" smtClean="0"/>
+              <a:t> als Objekt und/oder Listenstrukturen abgebildet</a:t>
+            </a:r>
+          </a:p>
+          <a:p>
+            <a:pPr lvl="1"/>
+            <a:r>
+              <a:rPr lang="de-CH" dirty="0" smtClean="0"/>
+              <a:t>Auf HTML Elemente kann eine </a:t>
+            </a:r>
+            <a:r>
+              <a:rPr lang="de-CH" dirty="0" err="1" smtClean="0"/>
+              <a:t>data</a:t>
+            </a:r>
+            <a:r>
+              <a:rPr lang="de-CH" dirty="0" smtClean="0"/>
+              <a:t>-bind auf ein Datenelement der Hintergrunddaten gelegt werden. Sobald im Hintergrund der Inhalt der Variable gewechselt wird, werden alle GUI-Elemente mitaktualisiert, die Daten der entsprechenden Variable anzeigen</a:t>
+            </a:r>
+          </a:p>
+          <a:p>
+            <a:pPr lvl="1"/>
+            <a:r>
+              <a:rPr lang="de-CH" dirty="0" smtClean="0"/>
+              <a:t>Weitere Beschreibung und Download siehe </a:t>
+            </a:r>
+            <a:r>
+              <a:rPr lang="de-CH" dirty="0">
+                <a:hlinkClick r:id="rId2"/>
+              </a:rPr>
+              <a:t>http://knockoutjs.com</a:t>
+            </a:r>
+            <a:r>
+              <a:rPr lang="de-CH" dirty="0" smtClean="0"/>
+              <a:t> </a:t>
+            </a:r>
+          </a:p>
+          <a:p>
+            <a:pPr lvl="1"/>
             <a:endParaRPr lang="de-CH" dirty="0" smtClean="0"/>
-          </a:p>
-          <a:p>
-            <a:pPr lvl="2"/>
-            <a:r>
-              <a:rPr lang="de-CH" dirty="0" err="1" smtClean="0">
-                <a:sym typeface="Wingdings" panose="05000000000000000000" pitchFamily="2" charset="2"/>
-              </a:rPr>
-              <a:t>Deadbold</a:t>
-            </a:r>
-            <a:endParaRPr lang="de-CH" dirty="0" smtClean="0">
-              <a:sym typeface="Wingdings" panose="05000000000000000000" pitchFamily="2" charset="2"/>
-            </a:endParaRPr>
-          </a:p>
-          <a:p>
-            <a:pPr lvl="2"/>
-            <a:r>
-              <a:rPr lang="de-CH" dirty="0" smtClean="0">
-                <a:sym typeface="Wingdings" panose="05000000000000000000" pitchFamily="2" charset="2"/>
-              </a:rPr>
-              <a:t>Play </a:t>
-            </a:r>
-            <a:r>
-              <a:rPr lang="de-CH" dirty="0" err="1" smtClean="0">
-                <a:sym typeface="Wingdings" panose="05000000000000000000" pitchFamily="2" charset="2"/>
-              </a:rPr>
-              <a:t>Authenticate</a:t>
-            </a:r>
-            <a:endParaRPr lang="de-CH" dirty="0" smtClean="0">
-              <a:sym typeface="Wingdings" panose="05000000000000000000" pitchFamily="2" charset="2"/>
-            </a:endParaRPr>
-          </a:p>
-          <a:p>
-            <a:r>
-              <a:rPr lang="de-CH" dirty="0" smtClean="0">
-                <a:sym typeface="Wingdings" panose="05000000000000000000" pitchFamily="2" charset="2"/>
-              </a:rPr>
-              <a:t>Play Framework unterstützt diverse Entwicklungsumgebungen wie </a:t>
-            </a:r>
-            <a:r>
-              <a:rPr lang="de-CH" dirty="0" err="1" smtClean="0">
-                <a:sym typeface="Wingdings" panose="05000000000000000000" pitchFamily="2" charset="2"/>
-              </a:rPr>
-              <a:t>Eclipse</a:t>
-            </a:r>
-            <a:r>
-              <a:rPr lang="de-CH" dirty="0" smtClean="0">
-                <a:sym typeface="Wingdings" panose="05000000000000000000" pitchFamily="2" charset="2"/>
-              </a:rPr>
-              <a:t>, </a:t>
-            </a:r>
-            <a:r>
-              <a:rPr lang="de-CH" dirty="0" err="1" smtClean="0">
-                <a:sym typeface="Wingdings" panose="05000000000000000000" pitchFamily="2" charset="2"/>
-              </a:rPr>
-              <a:t>Netbeans</a:t>
-            </a:r>
-            <a:r>
-              <a:rPr lang="de-CH" dirty="0" smtClean="0">
-                <a:sym typeface="Wingdings" panose="05000000000000000000" pitchFamily="2" charset="2"/>
-              </a:rPr>
-              <a:t>, </a:t>
-            </a:r>
-            <a:r>
-              <a:rPr lang="de-CH" dirty="0" err="1" smtClean="0">
-                <a:sym typeface="Wingdings" panose="05000000000000000000" pitchFamily="2" charset="2"/>
-              </a:rPr>
-              <a:t>Intellij</a:t>
-            </a:r>
-            <a:r>
-              <a:rPr lang="de-CH" dirty="0" smtClean="0">
-                <a:sym typeface="Wingdings" panose="05000000000000000000" pitchFamily="2" charset="2"/>
-              </a:rPr>
-              <a:t>, …</a:t>
-            </a:r>
-          </a:p>
-          <a:p>
-            <a:r>
-              <a:rPr lang="de-CH" dirty="0" err="1" smtClean="0">
-                <a:sym typeface="Wingdings" panose="05000000000000000000" pitchFamily="2" charset="2"/>
-              </a:rPr>
-              <a:t>JetBrains’s</a:t>
-            </a:r>
-            <a:r>
-              <a:rPr lang="de-CH" dirty="0" smtClean="0">
-                <a:sym typeface="Wingdings" panose="05000000000000000000" pitchFamily="2" charset="2"/>
-              </a:rPr>
-              <a:t> </a:t>
-            </a:r>
-            <a:r>
-              <a:rPr lang="de-CH" dirty="0" err="1" smtClean="0">
-                <a:sym typeface="Wingdings" panose="05000000000000000000" pitchFamily="2" charset="2"/>
-              </a:rPr>
-              <a:t>Intellij</a:t>
-            </a:r>
-            <a:r>
-              <a:rPr lang="de-CH" dirty="0" smtClean="0">
-                <a:sym typeface="Wingdings" panose="05000000000000000000" pitchFamily="2" charset="2"/>
-              </a:rPr>
-              <a:t> kam in diesem Projekt zum Einsatz und ist sehr empfehlenswert</a:t>
-            </a:r>
           </a:p>
         </p:txBody>
       </p:sp>
     </p:spTree>
     <p:extLst>
       <p:ext uri="{BB962C8B-B14F-4D97-AF65-F5344CB8AC3E}">
-        <p14:creationId xmlns:p14="http://schemas.microsoft.com/office/powerpoint/2010/main" val="2984728119"/>
+        <p14:creationId xmlns:p14="http://schemas.microsoft.com/office/powerpoint/2010/main" val="4226246965"/>
       </p:ext>
     </p:extLst>
   </p:cSld>

</xml_diff>